<commit_message>
copyright logo on recent pptx's, edit gcd-euclid/pptx
</commit_message>
<xml_diff>
--- a/spring15/slidesS15/Russell-paradox.pptx
+++ b/spring15/slidesS15/Russell-paradox.pptx
@@ -3426,9 +3426,9 @@
       </p:sp>
       <p:pic>
         <p:nvPicPr>
-          <p:cNvPr id="11" name="Picture 10" descr="license.img"/>
+          <p:cNvPr id="8" name="Picture 7"/>
           <p:cNvPicPr>
-            <a:picLocks/>
+            <a:picLocks noChangeAspect="1"/>
           </p:cNvPicPr>
           <p:nvPr userDrawn="1"/>
         </p:nvPicPr>
@@ -3440,8 +3440,8 @@
         </p:blipFill>
         <p:spPr>
           <a:xfrm>
-            <a:off x="76200" y="6486136"/>
-            <a:ext cx="990600" cy="304800"/>
+            <a:off x="0" y="6500090"/>
+            <a:ext cx="1016000" cy="357909"/>
           </a:xfrm>
           <a:prstGeom prst="rect">
             <a:avLst/>
@@ -7574,7 +7574,7 @@
           <a:graphicData uri="http://schemas.openxmlformats.org/presentationml/2006/ole">
             <mc:AlternateContent xmlns:mc="http://schemas.openxmlformats.org/markup-compatibility/2006">
               <mc:Choice xmlns:v="urn:schemas-microsoft-com:vml" Requires="v">
-                <p:oleObj spid="_x0000_s58597" name="Equation" r:id="rId5" imgW="1841400" imgH="279360" progId="Equation.DSMT4">
+                <p:oleObj spid="_x0000_s58601" name="Equation" r:id="rId5" imgW="1841400" imgH="279360" progId="Equation.DSMT4">
                   <p:embed/>
                 </p:oleObj>
               </mc:Choice>
@@ -7644,7 +7644,7 @@
           <a:graphicData uri="http://schemas.openxmlformats.org/presentationml/2006/ole">
             <mc:AlternateContent xmlns:mc="http://schemas.openxmlformats.org/markup-compatibility/2006">
               <mc:Choice xmlns:v="urn:schemas-microsoft-com:vml" Requires="v">
-                <p:oleObj spid="_x0000_s58598" name="Equation" r:id="rId7" imgW="1600200" imgH="279360" progId="Equation.DSMT4">
+                <p:oleObj spid="_x0000_s58602" name="Equation" r:id="rId7" imgW="1600200" imgH="279360" progId="Equation.DSMT4">
                   <p:embed/>
                 </p:oleObj>
               </mc:Choice>
@@ -7714,7 +7714,7 @@
           <a:graphicData uri="http://schemas.openxmlformats.org/presentationml/2006/ole">
             <mc:AlternateContent xmlns:mc="http://schemas.openxmlformats.org/markup-compatibility/2006">
               <mc:Choice xmlns:v="urn:schemas-microsoft-com:vml" Requires="v">
-                <p:oleObj spid="_x0000_s58599" name="Equation" r:id="rId9" imgW="1574640" imgH="279360" progId="Equation.DSMT4">
+                <p:oleObj spid="_x0000_s58603" name="Equation" r:id="rId9" imgW="1574640" imgH="279360" progId="Equation.DSMT4">
                   <p:embed/>
                 </p:oleObj>
               </mc:Choice>
@@ -8496,7 +8496,7 @@
           <a:graphicData uri="http://schemas.openxmlformats.org/presentationml/2006/ole">
             <mc:AlternateContent xmlns:mc="http://schemas.openxmlformats.org/markup-compatibility/2006">
               <mc:Choice xmlns:v="urn:schemas-microsoft-com:vml" Requires="v">
-                <p:oleObj spid="_x0000_s59489" name="Equation" r:id="rId5" imgW="1790640" imgH="279360" progId="Equation.DSMT4">
+                <p:oleObj spid="_x0000_s59491" name="Equation" r:id="rId5" imgW="1790640" imgH="279360" progId="Equation.DSMT4">
                   <p:embed/>
                 </p:oleObj>
               </mc:Choice>
@@ -10261,7 +10261,7 @@
           <a:graphicData uri="http://schemas.openxmlformats.org/presentationml/2006/ole">
             <mc:AlternateContent xmlns:mc="http://schemas.openxmlformats.org/markup-compatibility/2006">
               <mc:Choice xmlns:v="urn:schemas-microsoft-com:vml" Requires="v">
-                <p:oleObj spid="_x0000_s56611" name="Equation" r:id="rId4" imgW="698500" imgH="381000" progId="Equation.DSMT4">
+                <p:oleObj spid="_x0000_s56616" name="Equation" r:id="rId4" imgW="698500" imgH="381000" progId="Equation.DSMT4">
                   <p:embed/>
                 </p:oleObj>
               </mc:Choice>
@@ -10401,7 +10401,7 @@
           <a:graphicData uri="http://schemas.openxmlformats.org/presentationml/2006/ole">
             <mc:AlternateContent xmlns:mc="http://schemas.openxmlformats.org/markup-compatibility/2006">
               <mc:Choice xmlns:v="urn:schemas-microsoft-com:vml" Requires="v">
-                <p:oleObj spid="_x0000_s56612" name="Equation" r:id="rId6" imgW="977900" imgH="330200" progId="Equation.DSMT4">
+                <p:oleObj spid="_x0000_s56617" name="Equation" r:id="rId6" imgW="977900" imgH="330200" progId="Equation.DSMT4">
                   <p:embed/>
                 </p:oleObj>
               </mc:Choice>
@@ -10471,7 +10471,7 @@
           <a:graphicData uri="http://schemas.openxmlformats.org/presentationml/2006/ole">
             <mc:AlternateContent xmlns:mc="http://schemas.openxmlformats.org/markup-compatibility/2006">
               <mc:Choice xmlns:v="urn:schemas-microsoft-com:vml" Requires="v">
-                <p:oleObj spid="_x0000_s56613" name="Equation" r:id="rId8" imgW="965200" imgH="330200" progId="Equation.DSMT4">
+                <p:oleObj spid="_x0000_s56618" name="Equation" r:id="rId8" imgW="965200" imgH="330200" progId="Equation.DSMT4">
                   <p:embed/>
                 </p:oleObj>
               </mc:Choice>
@@ -10541,7 +10541,7 @@
           <a:graphicData uri="http://schemas.openxmlformats.org/presentationml/2006/ole">
             <mc:AlternateContent xmlns:mc="http://schemas.openxmlformats.org/markup-compatibility/2006">
               <mc:Choice xmlns:v="urn:schemas-microsoft-com:vml" Requires="v">
-                <p:oleObj spid="_x0000_s56614" name="Equation" r:id="rId10" imgW="647700" imgH="381000" progId="Equation.DSMT4">
+                <p:oleObj spid="_x0000_s56619" name="Equation" r:id="rId10" imgW="647700" imgH="381000" progId="Equation.DSMT4">
                   <p:embed/>
                 </p:oleObj>
               </mc:Choice>
@@ -11056,7 +11056,7 @@
           <a:graphicData uri="http://schemas.openxmlformats.org/presentationml/2006/ole">
             <mc:AlternateContent xmlns:mc="http://schemas.openxmlformats.org/markup-compatibility/2006">
               <mc:Choice xmlns:v="urn:schemas-microsoft-com:vml" Requires="v">
-                <p:oleObj spid="_x0000_s57505" name="Equation" r:id="rId4" imgW="1524000" imgH="406400" progId="Equation.DSMT4">
+                <p:oleObj spid="_x0000_s57508" name="Equation" r:id="rId4" imgW="1524000" imgH="406400" progId="Equation.DSMT4">
                   <p:embed/>
                 </p:oleObj>
               </mc:Choice>
@@ -11120,7 +11120,7 @@
           <a:graphicData uri="http://schemas.openxmlformats.org/presentationml/2006/ole">
             <mc:AlternateContent xmlns:mc="http://schemas.openxmlformats.org/markup-compatibility/2006">
               <mc:Choice xmlns:v="urn:schemas-microsoft-com:vml" Requires="v">
-                <p:oleObj spid="_x0000_s57506" name="Equation" r:id="rId6" imgW="1384200" imgH="266400" progId="Equation.DSMT4">
+                <p:oleObj spid="_x0000_s57509" name="Equation" r:id="rId6" imgW="1384200" imgH="266400" progId="Equation.DSMT4">
                   <p:embed/>
                 </p:oleObj>
               </mc:Choice>

</xml_diff>